<commit_message>
chassis changes, updated wep pulley bearings
</commit_message>
<xml_diff>
--- a/Update PPTs/8-28-2024 Chassis Changes.pptx
+++ b/Update PPTs/8-28-2024 Chassis Changes.pptx
@@ -263,7 +263,7 @@
           <a:p>
             <a:fld id="{F38D1DEC-B209-46FD-8804-CE3978FB8D7A}" type="datetimeFigureOut">
               <a:rPr lang="en-US" smtClean="0"/>
-              <a:t>9/1/2024</a:t>
+              <a:t>9/3/2024</a:t>
             </a:fld>
             <a:endParaRPr lang="en-US"/>
           </a:p>
@@ -461,7 +461,7 @@
           <a:p>
             <a:fld id="{F38D1DEC-B209-46FD-8804-CE3978FB8D7A}" type="datetimeFigureOut">
               <a:rPr lang="en-US" smtClean="0"/>
-              <a:t>9/1/2024</a:t>
+              <a:t>9/3/2024</a:t>
             </a:fld>
             <a:endParaRPr lang="en-US"/>
           </a:p>
@@ -669,7 +669,7 @@
           <a:p>
             <a:fld id="{F38D1DEC-B209-46FD-8804-CE3978FB8D7A}" type="datetimeFigureOut">
               <a:rPr lang="en-US" smtClean="0"/>
-              <a:t>9/1/2024</a:t>
+              <a:t>9/3/2024</a:t>
             </a:fld>
             <a:endParaRPr lang="en-US"/>
           </a:p>
@@ -867,7 +867,7 @@
           <a:p>
             <a:fld id="{F38D1DEC-B209-46FD-8804-CE3978FB8D7A}" type="datetimeFigureOut">
               <a:rPr lang="en-US" smtClean="0"/>
-              <a:t>9/1/2024</a:t>
+              <a:t>9/3/2024</a:t>
             </a:fld>
             <a:endParaRPr lang="en-US"/>
           </a:p>
@@ -1142,7 +1142,7 @@
           <a:p>
             <a:fld id="{F38D1DEC-B209-46FD-8804-CE3978FB8D7A}" type="datetimeFigureOut">
               <a:rPr lang="en-US" smtClean="0"/>
-              <a:t>9/1/2024</a:t>
+              <a:t>9/3/2024</a:t>
             </a:fld>
             <a:endParaRPr lang="en-US"/>
           </a:p>
@@ -1407,7 +1407,7 @@
           <a:p>
             <a:fld id="{F38D1DEC-B209-46FD-8804-CE3978FB8D7A}" type="datetimeFigureOut">
               <a:rPr lang="en-US" smtClean="0"/>
-              <a:t>9/1/2024</a:t>
+              <a:t>9/3/2024</a:t>
             </a:fld>
             <a:endParaRPr lang="en-US"/>
           </a:p>
@@ -1819,7 +1819,7 @@
           <a:p>
             <a:fld id="{F38D1DEC-B209-46FD-8804-CE3978FB8D7A}" type="datetimeFigureOut">
               <a:rPr lang="en-US" smtClean="0"/>
-              <a:t>9/1/2024</a:t>
+              <a:t>9/3/2024</a:t>
             </a:fld>
             <a:endParaRPr lang="en-US"/>
           </a:p>
@@ -1960,7 +1960,7 @@
           <a:p>
             <a:fld id="{F38D1DEC-B209-46FD-8804-CE3978FB8D7A}" type="datetimeFigureOut">
               <a:rPr lang="en-US" smtClean="0"/>
-              <a:t>9/1/2024</a:t>
+              <a:t>9/3/2024</a:t>
             </a:fld>
             <a:endParaRPr lang="en-US"/>
           </a:p>
@@ -2073,7 +2073,7 @@
           <a:p>
             <a:fld id="{F38D1DEC-B209-46FD-8804-CE3978FB8D7A}" type="datetimeFigureOut">
               <a:rPr lang="en-US" smtClean="0"/>
-              <a:t>9/1/2024</a:t>
+              <a:t>9/3/2024</a:t>
             </a:fld>
             <a:endParaRPr lang="en-US"/>
           </a:p>
@@ -2384,7 +2384,7 @@
           <a:p>
             <a:fld id="{F38D1DEC-B209-46FD-8804-CE3978FB8D7A}" type="datetimeFigureOut">
               <a:rPr lang="en-US" smtClean="0"/>
-              <a:t>9/1/2024</a:t>
+              <a:t>9/3/2024</a:t>
             </a:fld>
             <a:endParaRPr lang="en-US"/>
           </a:p>
@@ -2672,7 +2672,7 @@
           <a:p>
             <a:fld id="{F38D1DEC-B209-46FD-8804-CE3978FB8D7A}" type="datetimeFigureOut">
               <a:rPr lang="en-US" smtClean="0"/>
-              <a:t>9/1/2024</a:t>
+              <a:t>9/3/2024</a:t>
             </a:fld>
             <a:endParaRPr lang="en-US"/>
           </a:p>
@@ -2913,7 +2913,7 @@
           <a:p>
             <a:fld id="{F38D1DEC-B209-46FD-8804-CE3978FB8D7A}" type="datetimeFigureOut">
               <a:rPr lang="en-US" smtClean="0"/>
-              <a:t>9/1/2024</a:t>
+              <a:t>9/3/2024</a:t>
             </a:fld>
             <a:endParaRPr lang="en-US"/>
           </a:p>
@@ -3462,7 +3462,11 @@
           <a:bodyPr/>
           <a:lstStyle/>
           <a:p>
-            <a:endParaRPr lang="en-US"/>
+            <a:r>
+              <a:rPr lang="en-US" dirty="0" err="1"/>
+              <a:t>yipee</a:t>
+            </a:r>
+            <a:endParaRPr lang="en-US" dirty="0"/>
           </a:p>
         </p:txBody>
       </p:sp>

</xml_diff>